<commit_message>
Opstartverslag en fancy diagram
</commit_message>
<xml_diff>
--- a/Presentaties/Opstartverslag_27_feb.pptx
+++ b/Presentaties/Opstartverslag_27_feb.pptx
@@ -2,7 +2,7 @@
 <file path=ppt/presentation.xml><?xml version="1.0" encoding="utf-8"?>
 <p:presentation xmlns:a="http://schemas.openxmlformats.org/drawingml/2006/main" xmlns:r="http://schemas.openxmlformats.org/officeDocument/2006/relationships" xmlns:p="http://schemas.openxmlformats.org/presentationml/2006/main" saveSubsetFonts="1">
   <p:sldMasterIdLst>
-    <p:sldMasterId id="2147483648" r:id="rId1"/>
+    <p:sldMasterId id="2147483660" r:id="rId1"/>
   </p:sldMasterIdLst>
   <p:sldIdLst>
     <p:sldId id="256" r:id="rId2"/>
@@ -110,6 +110,11 @@
       </a:defRPr>
     </a:lvl9pPr>
   </p:defaultTextStyle>
+  <p:extLst>
+    <p:ext uri="{EFAFB233-063F-42B5-8137-9DF3F51BA10A}">
+      <p15:sldGuideLst xmlns:p15="http://schemas.microsoft.com/office/powerpoint/2012/main"/>
+    </p:ext>
+  </p:extLst>
 </p:presentation>
 </file>
 
@@ -244,7 +249,7 @@
           <a:p>
             <a:fld id="{6B065BBC-EF2F-4516-A526-6330BE039518}" type="datetimeFigureOut">
               <a:rPr lang="de-DE" smtClean="0"/>
-              <a:t>26.02.2018</a:t>
+              <a:t>21.03.2018</a:t>
             </a:fld>
             <a:endParaRPr lang="de-DE"/>
           </a:p>
@@ -295,7 +300,7 @@
     </p:spTree>
     <p:extLst>
       <p:ext uri="{BB962C8B-B14F-4D97-AF65-F5344CB8AC3E}">
-        <p14:creationId xmlns:p14="http://schemas.microsoft.com/office/powerpoint/2010/main" val="217861708"/>
+        <p14:creationId xmlns:p14="http://schemas.microsoft.com/office/powerpoint/2010/main" val="1011776400"/>
       </p:ext>
     </p:extLst>
   </p:cSld>
@@ -414,7 +419,7 @@
           <a:p>
             <a:fld id="{6B065BBC-EF2F-4516-A526-6330BE039518}" type="datetimeFigureOut">
               <a:rPr lang="de-DE" smtClean="0"/>
-              <a:t>26.02.2018</a:t>
+              <a:t>21.03.2018</a:t>
             </a:fld>
             <a:endParaRPr lang="de-DE"/>
           </a:p>
@@ -465,7 +470,7 @@
     </p:spTree>
     <p:extLst>
       <p:ext uri="{BB962C8B-B14F-4D97-AF65-F5344CB8AC3E}">
-        <p14:creationId xmlns:p14="http://schemas.microsoft.com/office/powerpoint/2010/main" val="162273565"/>
+        <p14:creationId xmlns:p14="http://schemas.microsoft.com/office/powerpoint/2010/main" val="1332989860"/>
       </p:ext>
     </p:extLst>
   </p:cSld>
@@ -594,7 +599,7 @@
           <a:p>
             <a:fld id="{6B065BBC-EF2F-4516-A526-6330BE039518}" type="datetimeFigureOut">
               <a:rPr lang="de-DE" smtClean="0"/>
-              <a:t>26.02.2018</a:t>
+              <a:t>21.03.2018</a:t>
             </a:fld>
             <a:endParaRPr lang="de-DE"/>
           </a:p>
@@ -645,7 +650,7 @@
     </p:spTree>
     <p:extLst>
       <p:ext uri="{BB962C8B-B14F-4D97-AF65-F5344CB8AC3E}">
-        <p14:creationId xmlns:p14="http://schemas.microsoft.com/office/powerpoint/2010/main" val="323360950"/>
+        <p14:creationId xmlns:p14="http://schemas.microsoft.com/office/powerpoint/2010/main" val="362178148"/>
       </p:ext>
     </p:extLst>
   </p:cSld>
@@ -764,7 +769,7 @@
           <a:p>
             <a:fld id="{6B065BBC-EF2F-4516-A526-6330BE039518}" type="datetimeFigureOut">
               <a:rPr lang="de-DE" smtClean="0"/>
-              <a:t>26.02.2018</a:t>
+              <a:t>21.03.2018</a:t>
             </a:fld>
             <a:endParaRPr lang="de-DE"/>
           </a:p>
@@ -815,7 +820,7 @@
     </p:spTree>
     <p:extLst>
       <p:ext uri="{BB962C8B-B14F-4D97-AF65-F5344CB8AC3E}">
-        <p14:creationId xmlns:p14="http://schemas.microsoft.com/office/powerpoint/2010/main" val="3852126486"/>
+        <p14:creationId xmlns:p14="http://schemas.microsoft.com/office/powerpoint/2010/main" val="3645432170"/>
       </p:ext>
     </p:extLst>
   </p:cSld>
@@ -1010,7 +1015,7 @@
           <a:p>
             <a:fld id="{6B065BBC-EF2F-4516-A526-6330BE039518}" type="datetimeFigureOut">
               <a:rPr lang="de-DE" smtClean="0"/>
-              <a:t>26.02.2018</a:t>
+              <a:t>21.03.2018</a:t>
             </a:fld>
             <a:endParaRPr lang="de-DE"/>
           </a:p>
@@ -1061,7 +1066,7 @@
     </p:spTree>
     <p:extLst>
       <p:ext uri="{BB962C8B-B14F-4D97-AF65-F5344CB8AC3E}">
-        <p14:creationId xmlns:p14="http://schemas.microsoft.com/office/powerpoint/2010/main" val="4111675553"/>
+        <p14:creationId xmlns:p14="http://schemas.microsoft.com/office/powerpoint/2010/main" val="2006487740"/>
       </p:ext>
     </p:extLst>
   </p:cSld>
@@ -1242,7 +1247,7 @@
           <a:p>
             <a:fld id="{6B065BBC-EF2F-4516-A526-6330BE039518}" type="datetimeFigureOut">
               <a:rPr lang="de-DE" smtClean="0"/>
-              <a:t>26.02.2018</a:t>
+              <a:t>21.03.2018</a:t>
             </a:fld>
             <a:endParaRPr lang="de-DE"/>
           </a:p>
@@ -1293,7 +1298,7 @@
     </p:spTree>
     <p:extLst>
       <p:ext uri="{BB962C8B-B14F-4D97-AF65-F5344CB8AC3E}">
-        <p14:creationId xmlns:p14="http://schemas.microsoft.com/office/powerpoint/2010/main" val="2662537172"/>
+        <p14:creationId xmlns:p14="http://schemas.microsoft.com/office/powerpoint/2010/main" val="1781685450"/>
       </p:ext>
     </p:extLst>
   </p:cSld>
@@ -1609,7 +1614,7 @@
           <a:p>
             <a:fld id="{6B065BBC-EF2F-4516-A526-6330BE039518}" type="datetimeFigureOut">
               <a:rPr lang="de-DE" smtClean="0"/>
-              <a:t>26.02.2018</a:t>
+              <a:t>21.03.2018</a:t>
             </a:fld>
             <a:endParaRPr lang="de-DE"/>
           </a:p>
@@ -1660,7 +1665,7 @@
     </p:spTree>
     <p:extLst>
       <p:ext uri="{BB962C8B-B14F-4D97-AF65-F5344CB8AC3E}">
-        <p14:creationId xmlns:p14="http://schemas.microsoft.com/office/powerpoint/2010/main" val="3695465742"/>
+        <p14:creationId xmlns:p14="http://schemas.microsoft.com/office/powerpoint/2010/main" val="3869345695"/>
       </p:ext>
     </p:extLst>
   </p:cSld>
@@ -1727,7 +1732,7 @@
           <a:p>
             <a:fld id="{6B065BBC-EF2F-4516-A526-6330BE039518}" type="datetimeFigureOut">
               <a:rPr lang="de-DE" smtClean="0"/>
-              <a:t>26.02.2018</a:t>
+              <a:t>21.03.2018</a:t>
             </a:fld>
             <a:endParaRPr lang="de-DE"/>
           </a:p>
@@ -1778,7 +1783,7 @@
     </p:spTree>
     <p:extLst>
       <p:ext uri="{BB962C8B-B14F-4D97-AF65-F5344CB8AC3E}">
-        <p14:creationId xmlns:p14="http://schemas.microsoft.com/office/powerpoint/2010/main" val="567080534"/>
+        <p14:creationId xmlns:p14="http://schemas.microsoft.com/office/powerpoint/2010/main" val="1853599475"/>
       </p:ext>
     </p:extLst>
   </p:cSld>
@@ -1822,7 +1827,7 @@
           <a:p>
             <a:fld id="{6B065BBC-EF2F-4516-A526-6330BE039518}" type="datetimeFigureOut">
               <a:rPr lang="de-DE" smtClean="0"/>
-              <a:t>26.02.2018</a:t>
+              <a:t>21.03.2018</a:t>
             </a:fld>
             <a:endParaRPr lang="de-DE"/>
           </a:p>
@@ -1873,7 +1878,7 @@
     </p:spTree>
     <p:extLst>
       <p:ext uri="{BB962C8B-B14F-4D97-AF65-F5344CB8AC3E}">
-        <p14:creationId xmlns:p14="http://schemas.microsoft.com/office/powerpoint/2010/main" val="1669519229"/>
+        <p14:creationId xmlns:p14="http://schemas.microsoft.com/office/powerpoint/2010/main" val="2455019780"/>
       </p:ext>
     </p:extLst>
   </p:cSld>
@@ -2099,7 +2104,7 @@
           <a:p>
             <a:fld id="{6B065BBC-EF2F-4516-A526-6330BE039518}" type="datetimeFigureOut">
               <a:rPr lang="de-DE" smtClean="0"/>
-              <a:t>26.02.2018</a:t>
+              <a:t>21.03.2018</a:t>
             </a:fld>
             <a:endParaRPr lang="de-DE"/>
           </a:p>
@@ -2150,7 +2155,7 @@
     </p:spTree>
     <p:extLst>
       <p:ext uri="{BB962C8B-B14F-4D97-AF65-F5344CB8AC3E}">
-        <p14:creationId xmlns:p14="http://schemas.microsoft.com/office/powerpoint/2010/main" val="398018089"/>
+        <p14:creationId xmlns:p14="http://schemas.microsoft.com/office/powerpoint/2010/main" val="1045395146"/>
       </p:ext>
     </p:extLst>
   </p:cSld>
@@ -2266,6 +2271,10 @@
             </a:lvl9pPr>
           </a:lstStyle>
           <a:p>
+            <a:r>
+              <a:rPr lang="en-US" smtClean="0"/>
+              <a:t>Click icon to add picture</a:t>
+            </a:r>
             <a:endParaRPr lang="de-DE"/>
           </a:p>
         </p:txBody>
@@ -2352,7 +2361,7 @@
           <a:p>
             <a:fld id="{6B065BBC-EF2F-4516-A526-6330BE039518}" type="datetimeFigureOut">
               <a:rPr lang="de-DE" smtClean="0"/>
-              <a:t>26.02.2018</a:t>
+              <a:t>21.03.2018</a:t>
             </a:fld>
             <a:endParaRPr lang="de-DE"/>
           </a:p>
@@ -2403,7 +2412,7 @@
     </p:spTree>
     <p:extLst>
       <p:ext uri="{BB962C8B-B14F-4D97-AF65-F5344CB8AC3E}">
-        <p14:creationId xmlns:p14="http://schemas.microsoft.com/office/powerpoint/2010/main" val="1471639940"/>
+        <p14:creationId xmlns:p14="http://schemas.microsoft.com/office/powerpoint/2010/main" val="800200651"/>
       </p:ext>
     </p:extLst>
   </p:cSld>
@@ -2570,7 +2579,7 @@
           <a:p>
             <a:fld id="{6B065BBC-EF2F-4516-A526-6330BE039518}" type="datetimeFigureOut">
               <a:rPr lang="de-DE" smtClean="0"/>
-              <a:t>26.02.2018</a:t>
+              <a:t>21.03.2018</a:t>
             </a:fld>
             <a:endParaRPr lang="de-DE"/>
           </a:p>
@@ -2657,23 +2666,23 @@
     </p:spTree>
     <p:extLst>
       <p:ext uri="{BB962C8B-B14F-4D97-AF65-F5344CB8AC3E}">
-        <p14:creationId xmlns:p14="http://schemas.microsoft.com/office/powerpoint/2010/main" val="2640605210"/>
+        <p14:creationId xmlns:p14="http://schemas.microsoft.com/office/powerpoint/2010/main" val="4070218682"/>
       </p:ext>
     </p:extLst>
   </p:cSld>
   <p:clrMap bg1="lt1" tx1="dk1" bg2="lt2" tx2="dk2" accent1="accent1" accent2="accent2" accent3="accent3" accent4="accent4" accent5="accent5" accent6="accent6" hlink="hlink" folHlink="folHlink"/>
   <p:sldLayoutIdLst>
-    <p:sldLayoutId id="2147483649" r:id="rId1"/>
-    <p:sldLayoutId id="2147483650" r:id="rId2"/>
-    <p:sldLayoutId id="2147483651" r:id="rId3"/>
-    <p:sldLayoutId id="2147483652" r:id="rId4"/>
-    <p:sldLayoutId id="2147483653" r:id="rId5"/>
-    <p:sldLayoutId id="2147483654" r:id="rId6"/>
-    <p:sldLayoutId id="2147483655" r:id="rId7"/>
-    <p:sldLayoutId id="2147483656" r:id="rId8"/>
-    <p:sldLayoutId id="2147483657" r:id="rId9"/>
-    <p:sldLayoutId id="2147483658" r:id="rId10"/>
-    <p:sldLayoutId id="2147483659" r:id="rId11"/>
+    <p:sldLayoutId id="2147483661" r:id="rId1"/>
+    <p:sldLayoutId id="2147483662" r:id="rId2"/>
+    <p:sldLayoutId id="2147483663" r:id="rId3"/>
+    <p:sldLayoutId id="2147483664" r:id="rId4"/>
+    <p:sldLayoutId id="2147483665" r:id="rId5"/>
+    <p:sldLayoutId id="2147483666" r:id="rId6"/>
+    <p:sldLayoutId id="2147483667" r:id="rId7"/>
+    <p:sldLayoutId id="2147483668" r:id="rId8"/>
+    <p:sldLayoutId id="2147483669" r:id="rId9"/>
+    <p:sldLayoutId id="2147483670" r:id="rId10"/>
+    <p:sldLayoutId id="2147483671" r:id="rId11"/>
   </p:sldLayoutIdLst>
   <p:txStyles>
     <p:titleStyle>
@@ -4105,7 +4114,7 @@
 </file>
 
 <file path=ppt/theme/theme1.xml><?xml version="1.0" encoding="utf-8"?>
-<a:theme xmlns:a="http://schemas.openxmlformats.org/drawingml/2006/main" name="Office Theme">
+<a:theme xmlns:a="http://schemas.openxmlformats.org/drawingml/2006/main" name="Chocolate_n_Mint">
   <a:themeElements>
     <a:clrScheme name="Office">
       <a:dk1>
@@ -4145,76 +4154,16 @@
         <a:srgbClr val="954F72"/>
       </a:folHlink>
     </a:clrScheme>
-    <a:fontScheme name="Office">
+    <a:fontScheme name="Custom 1">
       <a:majorFont>
-        <a:latin typeface="Calibri Light" panose="020F0302020204030204"/>
+        <a:latin typeface="Gill Sans MT"/>
         <a:ea typeface=""/>
         <a:cs typeface=""/>
-        <a:font script="Jpan" typeface="游ゴシック Light"/>
-        <a:font script="Hang" typeface="맑은 고딕"/>
-        <a:font script="Hans" typeface="等线 Light"/>
-        <a:font script="Hant" typeface="新細明體"/>
-        <a:font script="Arab" typeface="Times New Roman"/>
-        <a:font script="Hebr" typeface="Times New Roman"/>
-        <a:font script="Thai" typeface="Angsana New"/>
-        <a:font script="Ethi" typeface="Nyala"/>
-        <a:font script="Beng" typeface="Vrinda"/>
-        <a:font script="Gujr" typeface="Shruti"/>
-        <a:font script="Khmr" typeface="MoolBoran"/>
-        <a:font script="Knda" typeface="Tunga"/>
-        <a:font script="Guru" typeface="Raavi"/>
-        <a:font script="Cans" typeface="Euphemia"/>
-        <a:font script="Cher" typeface="Plantagenet Cherokee"/>
-        <a:font script="Yiii" typeface="Microsoft Yi Baiti"/>
-        <a:font script="Tibt" typeface="Microsoft Himalaya"/>
-        <a:font script="Thaa" typeface="MV Boli"/>
-        <a:font script="Deva" typeface="Mangal"/>
-        <a:font script="Telu" typeface="Gautami"/>
-        <a:font script="Taml" typeface="Latha"/>
-        <a:font script="Syrc" typeface="Estrangelo Edessa"/>
-        <a:font script="Orya" typeface="Kalinga"/>
-        <a:font script="Mlym" typeface="Kartika"/>
-        <a:font script="Laoo" typeface="DokChampa"/>
-        <a:font script="Sinh" typeface="Iskoola Pota"/>
-        <a:font script="Mong" typeface="Mongolian Baiti"/>
-        <a:font script="Viet" typeface="Times New Roman"/>
-        <a:font script="Uigh" typeface="Microsoft Uighur"/>
-        <a:font script="Geor" typeface="Sylfaen"/>
       </a:majorFont>
       <a:minorFont>
-        <a:latin typeface="Calibri" panose="020F0502020204030204"/>
+        <a:latin typeface="Gill Sans MT"/>
         <a:ea typeface=""/>
         <a:cs typeface=""/>
-        <a:font script="Jpan" typeface="游ゴシック"/>
-        <a:font script="Hang" typeface="맑은 고딕"/>
-        <a:font script="Hans" typeface="等线"/>
-        <a:font script="Hant" typeface="新細明體"/>
-        <a:font script="Arab" typeface="Arial"/>
-        <a:font script="Hebr" typeface="Arial"/>
-        <a:font script="Thai" typeface="Cordia New"/>
-        <a:font script="Ethi" typeface="Nyala"/>
-        <a:font script="Beng" typeface="Vrinda"/>
-        <a:font script="Gujr" typeface="Shruti"/>
-        <a:font script="Khmr" typeface="DaunPenh"/>
-        <a:font script="Knda" typeface="Tunga"/>
-        <a:font script="Guru" typeface="Raavi"/>
-        <a:font script="Cans" typeface="Euphemia"/>
-        <a:font script="Cher" typeface="Plantagenet Cherokee"/>
-        <a:font script="Yiii" typeface="Microsoft Yi Baiti"/>
-        <a:font script="Tibt" typeface="Microsoft Himalaya"/>
-        <a:font script="Thaa" typeface="MV Boli"/>
-        <a:font script="Deva" typeface="Mangal"/>
-        <a:font script="Telu" typeface="Gautami"/>
-        <a:font script="Taml" typeface="Latha"/>
-        <a:font script="Syrc" typeface="Estrangelo Edessa"/>
-        <a:font script="Orya" typeface="Kalinga"/>
-        <a:font script="Mlym" typeface="Kartika"/>
-        <a:font script="Laoo" typeface="DokChampa"/>
-        <a:font script="Sinh" typeface="Iskoola Pota"/>
-        <a:font script="Mong" typeface="Mongolian Baiti"/>
-        <a:font script="Viet" typeface="Arial"/>
-        <a:font script="Uigh" typeface="Microsoft Uighur"/>
-        <a:font script="Geor" typeface="Sylfaen"/>
       </a:minorFont>
     </a:fontScheme>
     <a:fmtScheme name="Office">
@@ -4359,51 +4308,8 @@
   <a:extraClrSchemeLst/>
   <a:extLst>
     <a:ext uri="{05A4C25C-085E-4340-85A3-A5531E510DB2}">
-      <thm15:themeFamily xmlns:thm15="http://schemas.microsoft.com/office/thememl/2012/main" name="Office Theme" id="{62F939B6-93AF-4DB8-9C6B-D6C7DFDC589F}" vid="{4A3C46E8-61CC-4603-A589-7422A47A8E4A}"/>
+      <thm15:themeFamily xmlns:thm15="http://schemas.microsoft.com/office/thememl/2012/main" name="Chocolate_n_Mint" id="{815A938E-0F7B-4424-B4BA-FEFAB78F85FD}" vid="{1B106621-D9ED-48A5-A1D5-14099F26A303}"/>
     </a:ext>
   </a:extLst>
 </a:theme>
-</file>
-
-<file path=ppt/theme/themeOverride1.xml><?xml version="1.0" encoding="utf-8"?>
-<a:themeOverride xmlns:a="http://schemas.openxmlformats.org/drawingml/2006/main">
-  <a:clrScheme name="Office">
-    <a:dk1>
-      <a:sysClr val="windowText" lastClr="000000"/>
-    </a:dk1>
-    <a:lt1>
-      <a:sysClr val="window" lastClr="FFFFFF"/>
-    </a:lt1>
-    <a:dk2>
-      <a:srgbClr val="44546A"/>
-    </a:dk2>
-    <a:lt2>
-      <a:srgbClr val="E7E6E6"/>
-    </a:lt2>
-    <a:accent1>
-      <a:srgbClr val="5B9BD5"/>
-    </a:accent1>
-    <a:accent2>
-      <a:srgbClr val="ED7D31"/>
-    </a:accent2>
-    <a:accent3>
-      <a:srgbClr val="A5A5A5"/>
-    </a:accent3>
-    <a:accent4>
-      <a:srgbClr val="FFC000"/>
-    </a:accent4>
-    <a:accent5>
-      <a:srgbClr val="4472C4"/>
-    </a:accent5>
-    <a:accent6>
-      <a:srgbClr val="70AD47"/>
-    </a:accent6>
-    <a:hlink>
-      <a:srgbClr val="0563C1"/>
-    </a:hlink>
-    <a:folHlink>
-      <a:srgbClr val="954F72"/>
-    </a:folHlink>
-  </a:clrScheme>
-</a:themeOverride>
 </file>
</xml_diff>